<commit_message>
Added sequence diagram for Budget and Recurrence
</commit_message>
<xml_diff>
--- a/docs/diagrams/BudgetCommandSequenceDiagram.pptx
+++ b/docs/diagrams/BudgetCommandSequenceDiagram.pptx
@@ -104,6 +104,11 @@
       </a:defRPr>
     </a:lvl9pPr>
   </p:defaultTextStyle>
+  <p:extLst>
+    <p:ext uri="{EFAFB233-063F-42B5-8137-9DF3F51BA10A}">
+      <p15:sldGuideLst xmlns:p15="http://schemas.microsoft.com/office/powerpoint/2012/main"/>
+    </p:ext>
+  </p:extLst>
 </p:presentation>
 </file>
 
@@ -256,7 +261,7 @@
           <a:p>
             <a:fld id="{846B6803-89CD-4F5F-B245-D2D1AEF34DFD}" type="datetimeFigureOut">
               <a:rPr lang="en-SG" smtClean="0"/>
-              <a:t>24/10/2018</a:t>
+              <a:t>26/10/2018</a:t>
             </a:fld>
             <a:endParaRPr lang="en-SG"/>
           </a:p>
@@ -456,7 +461,7 @@
           <a:p>
             <a:fld id="{846B6803-89CD-4F5F-B245-D2D1AEF34DFD}" type="datetimeFigureOut">
               <a:rPr lang="en-SG" smtClean="0"/>
-              <a:t>24/10/2018</a:t>
+              <a:t>26/10/2018</a:t>
             </a:fld>
             <a:endParaRPr lang="en-SG"/>
           </a:p>
@@ -666,7 +671,7 @@
           <a:p>
             <a:fld id="{846B6803-89CD-4F5F-B245-D2D1AEF34DFD}" type="datetimeFigureOut">
               <a:rPr lang="en-SG" smtClean="0"/>
-              <a:t>24/10/2018</a:t>
+              <a:t>26/10/2018</a:t>
             </a:fld>
             <a:endParaRPr lang="en-SG"/>
           </a:p>
@@ -866,7 +871,7 @@
           <a:p>
             <a:fld id="{846B6803-89CD-4F5F-B245-D2D1AEF34DFD}" type="datetimeFigureOut">
               <a:rPr lang="en-SG" smtClean="0"/>
-              <a:t>24/10/2018</a:t>
+              <a:t>26/10/2018</a:t>
             </a:fld>
             <a:endParaRPr lang="en-SG"/>
           </a:p>
@@ -1142,7 +1147,7 @@
           <a:p>
             <a:fld id="{846B6803-89CD-4F5F-B245-D2D1AEF34DFD}" type="datetimeFigureOut">
               <a:rPr lang="en-SG" smtClean="0"/>
-              <a:t>24/10/2018</a:t>
+              <a:t>26/10/2018</a:t>
             </a:fld>
             <a:endParaRPr lang="en-SG"/>
           </a:p>
@@ -1410,7 +1415,7 @@
           <a:p>
             <a:fld id="{846B6803-89CD-4F5F-B245-D2D1AEF34DFD}" type="datetimeFigureOut">
               <a:rPr lang="en-SG" smtClean="0"/>
-              <a:t>24/10/2018</a:t>
+              <a:t>26/10/2018</a:t>
             </a:fld>
             <a:endParaRPr lang="en-SG"/>
           </a:p>
@@ -1825,7 +1830,7 @@
           <a:p>
             <a:fld id="{846B6803-89CD-4F5F-B245-D2D1AEF34DFD}" type="datetimeFigureOut">
               <a:rPr lang="en-SG" smtClean="0"/>
-              <a:t>24/10/2018</a:t>
+              <a:t>26/10/2018</a:t>
             </a:fld>
             <a:endParaRPr lang="en-SG"/>
           </a:p>
@@ -1967,7 +1972,7 @@
           <a:p>
             <a:fld id="{846B6803-89CD-4F5F-B245-D2D1AEF34DFD}" type="datetimeFigureOut">
               <a:rPr lang="en-SG" smtClean="0"/>
-              <a:t>24/10/2018</a:t>
+              <a:t>26/10/2018</a:t>
             </a:fld>
             <a:endParaRPr lang="en-SG"/>
           </a:p>
@@ -2080,7 +2085,7 @@
           <a:p>
             <a:fld id="{846B6803-89CD-4F5F-B245-D2D1AEF34DFD}" type="datetimeFigureOut">
               <a:rPr lang="en-SG" smtClean="0"/>
-              <a:t>24/10/2018</a:t>
+              <a:t>26/10/2018</a:t>
             </a:fld>
             <a:endParaRPr lang="en-SG"/>
           </a:p>
@@ -2393,7 +2398,7 @@
           <a:p>
             <a:fld id="{846B6803-89CD-4F5F-B245-D2D1AEF34DFD}" type="datetimeFigureOut">
               <a:rPr lang="en-SG" smtClean="0"/>
-              <a:t>24/10/2018</a:t>
+              <a:t>26/10/2018</a:t>
             </a:fld>
             <a:endParaRPr lang="en-SG"/>
           </a:p>
@@ -2682,7 +2687,7 @@
           <a:p>
             <a:fld id="{846B6803-89CD-4F5F-B245-D2D1AEF34DFD}" type="datetimeFigureOut">
               <a:rPr lang="en-SG" smtClean="0"/>
-              <a:t>24/10/2018</a:t>
+              <a:t>26/10/2018</a:t>
             </a:fld>
             <a:endParaRPr lang="en-SG"/>
           </a:p>
@@ -2925,7 +2930,7 @@
           <a:p>
             <a:fld id="{846B6803-89CD-4F5F-B245-D2D1AEF34DFD}" type="datetimeFigureOut">
               <a:rPr lang="en-SG" smtClean="0"/>
-              <a:t>24/10/2018</a:t>
+              <a:t>26/10/2018</a:t>
             </a:fld>
             <a:endParaRPr lang="en-SG"/>
           </a:p>
@@ -3356,7 +3361,7 @@
         </p:nvSpPr>
         <p:spPr>
           <a:xfrm>
-            <a:off x="304800" y="397566"/>
+            <a:off x="1002631" y="277250"/>
             <a:ext cx="7252956" cy="5857645"/>
           </a:xfrm>
           <a:prstGeom prst="roundRect">
@@ -3423,7 +3428,7 @@
         </p:nvSpPr>
         <p:spPr>
           <a:xfrm>
-            <a:off x="464047" y="772546"/>
+            <a:off x="1161878" y="652230"/>
             <a:ext cx="1455629" cy="346760"/>
           </a:xfrm>
           <a:prstGeom prst="rect">
@@ -3496,7 +3501,7 @@
         </p:nvCxnSpPr>
         <p:spPr>
           <a:xfrm>
-            <a:off x="1191859" y="1136219"/>
+            <a:off x="1889690" y="1015903"/>
             <a:ext cx="0" cy="2597583"/>
           </a:xfrm>
           <a:prstGeom prst="line">
@@ -3539,7 +3544,7 @@
         </p:nvSpPr>
         <p:spPr>
           <a:xfrm>
-            <a:off x="1119852" y="1486912"/>
+            <a:off x="1817683" y="1366596"/>
             <a:ext cx="141523" cy="7020984"/>
           </a:xfrm>
           <a:prstGeom prst="rect">
@@ -3592,7 +3597,7 @@
         </p:nvSpPr>
         <p:spPr>
           <a:xfrm>
-            <a:off x="2362200" y="655309"/>
+            <a:off x="3060031" y="534993"/>
             <a:ext cx="1219200" cy="467684"/>
           </a:xfrm>
           <a:prstGeom prst="rect">
@@ -3668,7 +3673,7 @@
         </p:nvCxnSpPr>
         <p:spPr>
           <a:xfrm>
-            <a:off x="2975599" y="1139904"/>
+            <a:off x="3673430" y="1019588"/>
             <a:ext cx="0" cy="1695374"/>
           </a:xfrm>
           <a:prstGeom prst="line">
@@ -3711,7 +3716,7 @@
         </p:nvSpPr>
         <p:spPr>
           <a:xfrm>
-            <a:off x="2903591" y="1598096"/>
+            <a:off x="3601422" y="1477780"/>
             <a:ext cx="170590" cy="2583154"/>
           </a:xfrm>
           <a:prstGeom prst="rect">
@@ -3764,7 +3769,7 @@
         </p:nvSpPr>
         <p:spPr>
           <a:xfrm>
-            <a:off x="6199517" y="2357380"/>
+            <a:off x="6897348" y="2237064"/>
             <a:ext cx="1093635" cy="461538"/>
           </a:xfrm>
           <a:prstGeom prst="rect">
@@ -3855,7 +3860,7 @@
         </p:nvCxnSpPr>
         <p:spPr>
           <a:xfrm>
-            <a:off x="6396187" y="2819400"/>
+            <a:off x="7094018" y="2699084"/>
             <a:ext cx="0" cy="381000"/>
           </a:xfrm>
           <a:prstGeom prst="line">
@@ -3898,7 +3903,7 @@
         </p:nvSpPr>
         <p:spPr>
           <a:xfrm>
-            <a:off x="6315374" y="2819400"/>
+            <a:off x="7013205" y="2699084"/>
             <a:ext cx="161626" cy="212934"/>
           </a:xfrm>
           <a:prstGeom prst="rect">
@@ -3951,7 +3956,7 @@
         </p:nvCxnSpPr>
         <p:spPr>
           <a:xfrm>
-            <a:off x="2" y="1490599"/>
+            <a:off x="697833" y="1370283"/>
             <a:ext cx="1119851" cy="0"/>
           </a:xfrm>
           <a:prstGeom prst="straightConnector1">
@@ -3993,7 +3998,7 @@
         </p:nvCxnSpPr>
         <p:spPr>
           <a:xfrm flipV="1">
-            <a:off x="1272251" y="1598099"/>
+            <a:off x="1970082" y="1477783"/>
             <a:ext cx="1596514" cy="1"/>
           </a:xfrm>
           <a:prstGeom prst="straightConnector1">
@@ -4035,7 +4040,7 @@
         </p:nvSpPr>
         <p:spPr>
           <a:xfrm>
-            <a:off x="-586646" y="1219200"/>
+            <a:off x="111185" y="1098884"/>
             <a:ext cx="1424846" cy="430887"/>
           </a:xfrm>
           <a:prstGeom prst="rect">
@@ -4093,7 +4098,7 @@
         </p:nvCxnSpPr>
         <p:spPr>
           <a:xfrm flipV="1">
-            <a:off x="4876215" y="2727292"/>
+            <a:off x="5574046" y="2606976"/>
             <a:ext cx="1323302" cy="1"/>
           </a:xfrm>
           <a:prstGeom prst="straightConnector1">
@@ -4135,7 +4140,7 @@
         </p:nvSpPr>
         <p:spPr>
           <a:xfrm>
-            <a:off x="3657602" y="4508956"/>
+            <a:off x="4355433" y="4388640"/>
             <a:ext cx="855809" cy="215444"/>
           </a:xfrm>
           <a:prstGeom prst="rect">
@@ -4181,7 +4186,7 @@
         </p:nvCxnSpPr>
         <p:spPr>
           <a:xfrm>
-            <a:off x="4876800" y="3038061"/>
+            <a:off x="5574631" y="2917745"/>
             <a:ext cx="1492974" cy="0"/>
           </a:xfrm>
           <a:prstGeom prst="straightConnector1">
@@ -4225,7 +4230,7 @@
         </p:nvCxnSpPr>
         <p:spPr>
           <a:xfrm flipV="1">
-            <a:off x="1289186" y="4185622"/>
+            <a:off x="1987017" y="4065306"/>
             <a:ext cx="1596514" cy="5378"/>
           </a:xfrm>
           <a:prstGeom prst="straightConnector1">
@@ -4269,7 +4274,7 @@
         </p:nvCxnSpPr>
         <p:spPr>
           <a:xfrm>
-            <a:off x="-76200" y="8534400"/>
+            <a:off x="621631" y="8414084"/>
             <a:ext cx="1196051" cy="0"/>
           </a:xfrm>
           <a:prstGeom prst="straightConnector1">
@@ -4313,7 +4318,7 @@
         </p:nvSpPr>
         <p:spPr>
           <a:xfrm>
-            <a:off x="7884896" y="838200"/>
+            <a:off x="8582727" y="717884"/>
             <a:ext cx="1030504" cy="346760"/>
           </a:xfrm>
           <a:prstGeom prst="rect">
@@ -4384,7 +4389,7 @@
         </p:nvCxnSpPr>
         <p:spPr>
           <a:xfrm>
-            <a:off x="1272253" y="4723917"/>
+            <a:off x="1970084" y="4603601"/>
             <a:ext cx="5043123" cy="0"/>
           </a:xfrm>
           <a:prstGeom prst="straightConnector1">
@@ -4426,7 +4431,7 @@
         </p:nvSpPr>
         <p:spPr>
           <a:xfrm>
-            <a:off x="6306454" y="4695599"/>
+            <a:off x="7004285" y="4575283"/>
             <a:ext cx="152383" cy="3533992"/>
           </a:xfrm>
           <a:prstGeom prst="rect">
@@ -4482,7 +4487,7 @@
         </p:nvCxnSpPr>
         <p:spPr>
           <a:xfrm flipH="1">
-            <a:off x="8382000" y="1176860"/>
+            <a:off x="9079831" y="1056544"/>
             <a:ext cx="18148" cy="3576339"/>
           </a:xfrm>
           <a:prstGeom prst="line">
@@ -4528,7 +4533,7 @@
         </p:nvSpPr>
         <p:spPr>
           <a:xfrm>
-            <a:off x="8305800" y="4753199"/>
+            <a:off x="9003631" y="4632883"/>
             <a:ext cx="152400" cy="199803"/>
           </a:xfrm>
           <a:prstGeom prst="rect">
@@ -4587,7 +4592,7 @@
         </p:nvCxnSpPr>
         <p:spPr>
           <a:xfrm>
-            <a:off x="6469665" y="4753197"/>
+            <a:off x="7167496" y="4632881"/>
             <a:ext cx="1836137" cy="0"/>
           </a:xfrm>
           <a:prstGeom prst="straightConnector1">
@@ -4629,7 +4634,7 @@
         </p:nvCxnSpPr>
         <p:spPr>
           <a:xfrm flipV="1">
-            <a:off x="6467774" y="4943250"/>
+            <a:off x="7165605" y="4822934"/>
             <a:ext cx="1838026" cy="9750"/>
           </a:xfrm>
           <a:prstGeom prst="straightConnector1">
@@ -4676,7 +4681,7 @@
         </p:nvCxnSpPr>
         <p:spPr>
           <a:xfrm>
-            <a:off x="1272251" y="8229600"/>
+            <a:off x="1970082" y="8109284"/>
             <a:ext cx="5052349" cy="0"/>
           </a:xfrm>
           <a:prstGeom prst="straightConnector1">
@@ -4720,7 +4725,7 @@
         </p:nvSpPr>
         <p:spPr>
           <a:xfrm>
-            <a:off x="6652354" y="4343400"/>
+            <a:off x="7350185" y="4223084"/>
             <a:ext cx="1424846" cy="338554"/>
           </a:xfrm>
           <a:prstGeom prst="rect">
@@ -4751,7 +4756,7 @@
                   <a:srgbClr val="7030A0"/>
                 </a:solidFill>
               </a:rPr>
-              <a:t>ModifyMaximumBudget</a:t>
+              <a:t>modifyMaximumBudget</a:t>
             </a:r>
             <a:endParaRPr lang="en-US" sz="1100" dirty="0">
               <a:solidFill>
@@ -4766,7 +4771,7 @@
                   <a:srgbClr val="7030A0"/>
                 </a:solidFill>
               </a:rPr>
-              <a:t>(2.00)</a:t>
+              <a:t>(budget)</a:t>
             </a:r>
           </a:p>
         </p:txBody>
@@ -4785,7 +4790,7 @@
         </p:nvSpPr>
         <p:spPr>
           <a:xfrm>
-            <a:off x="3352800" y="1981200"/>
+            <a:off x="4050631" y="1860884"/>
             <a:ext cx="1042552" cy="184666"/>
           </a:xfrm>
           <a:prstGeom prst="rect">
@@ -4831,7 +4836,7 @@
         </p:nvSpPr>
         <p:spPr>
           <a:xfrm>
-            <a:off x="1242154" y="1143002"/>
+            <a:off x="1939985" y="1022686"/>
             <a:ext cx="1391716" cy="430887"/>
           </a:xfrm>
           <a:prstGeom prst="rect">
@@ -4892,7 +4897,7 @@
         </p:nvSpPr>
         <p:spPr>
           <a:xfrm>
-            <a:off x="3959137" y="7998523"/>
+            <a:off x="4656968" y="7878207"/>
             <a:ext cx="621216" cy="215444"/>
           </a:xfrm>
           <a:prstGeom prst="rect">
@@ -4938,7 +4943,7 @@
         </p:nvSpPr>
         <p:spPr>
           <a:xfrm>
-            <a:off x="218983" y="8281688"/>
+            <a:off x="916814" y="8161372"/>
             <a:ext cx="762000" cy="215444"/>
           </a:xfrm>
           <a:prstGeom prst="rect">
@@ -4984,7 +4989,7 @@
         </p:nvSpPr>
         <p:spPr>
           <a:xfrm>
-            <a:off x="6639246" y="7467600"/>
+            <a:off x="7337077" y="7347284"/>
             <a:ext cx="1590354" cy="461538"/>
           </a:xfrm>
           <a:prstGeom prst="rect">
@@ -5049,7 +5054,7 @@
         </p:nvSpPr>
         <p:spPr>
           <a:xfrm>
-            <a:off x="7396323" y="7929138"/>
+            <a:off x="8094154" y="7808822"/>
             <a:ext cx="152400" cy="171376"/>
           </a:xfrm>
           <a:prstGeom prst="rect">
@@ -5102,7 +5107,7 @@
         </p:nvCxnSpPr>
         <p:spPr>
           <a:xfrm>
-            <a:off x="6477000" y="8100514"/>
+            <a:off x="7174831" y="7980198"/>
             <a:ext cx="966624" cy="0"/>
           </a:xfrm>
           <a:prstGeom prst="straightConnector1">
@@ -5146,7 +5151,7 @@
         </p:nvSpPr>
         <p:spPr>
           <a:xfrm>
-            <a:off x="3850983" y="1405841"/>
+            <a:off x="4548814" y="1285525"/>
             <a:ext cx="1778201" cy="432035"/>
           </a:xfrm>
           <a:prstGeom prst="rect">
@@ -5235,7 +5240,7 @@
         </p:nvCxnSpPr>
         <p:spPr>
           <a:xfrm>
-            <a:off x="3081591" y="2209801"/>
+            <a:off x="3779422" y="2089485"/>
             <a:ext cx="1597356" cy="1"/>
           </a:xfrm>
           <a:prstGeom prst="straightConnector1">
@@ -5275,7 +5280,7 @@
         </p:nvSpPr>
         <p:spPr>
           <a:xfrm>
-            <a:off x="4678949" y="1828802"/>
+            <a:off x="5376780" y="1708486"/>
             <a:ext cx="205843" cy="123165"/>
           </a:xfrm>
           <a:prstGeom prst="rect">
@@ -5332,7 +5337,7 @@
         </p:nvCxnSpPr>
         <p:spPr>
           <a:xfrm flipH="1">
-            <a:off x="4781867" y="1828800"/>
+            <a:off x="5479698" y="1708484"/>
             <a:ext cx="2" cy="2557790"/>
           </a:xfrm>
           <a:prstGeom prst="line">
@@ -5375,7 +5380,7 @@
         </p:nvSpPr>
         <p:spPr>
           <a:xfrm>
-            <a:off x="4678950" y="2193731"/>
+            <a:off x="5376781" y="2073415"/>
             <a:ext cx="161111" cy="1895915"/>
           </a:xfrm>
           <a:prstGeom prst="rect">
@@ -5428,7 +5433,7 @@
         </p:nvCxnSpPr>
         <p:spPr>
           <a:xfrm>
-            <a:off x="3118384" y="3124200"/>
+            <a:off x="3816215" y="3003884"/>
             <a:ext cx="1667219" cy="0"/>
           </a:xfrm>
           <a:prstGeom prst="straightConnector1">
@@ -5474,7 +5479,7 @@
         </p:nvCxnSpPr>
         <p:spPr>
           <a:xfrm>
-            <a:off x="6477000" y="7467600"/>
+            <a:off x="7174831" y="7347284"/>
             <a:ext cx="162246" cy="0"/>
           </a:xfrm>
           <a:prstGeom prst="straightConnector1">
@@ -5514,7 +5519,7 @@
         </p:nvCxnSpPr>
         <p:spPr>
           <a:xfrm>
-            <a:off x="3031425" y="1649006"/>
+            <a:off x="3729256" y="1528690"/>
             <a:ext cx="819556" cy="1"/>
           </a:xfrm>
           <a:prstGeom prst="straightConnector1">
@@ -5556,7 +5561,7 @@
         </p:nvCxnSpPr>
         <p:spPr>
           <a:xfrm>
-            <a:off x="3078519" y="1951965"/>
+            <a:off x="3776350" y="1831649"/>
             <a:ext cx="1600428" cy="0"/>
           </a:xfrm>
           <a:prstGeom prst="straightConnector1">
@@ -5600,7 +5605,7 @@
         </p:nvSpPr>
         <p:spPr>
           <a:xfrm>
-            <a:off x="4652665" y="4386590"/>
+            <a:off x="5350496" y="4266274"/>
             <a:ext cx="258404" cy="261610"/>
           </a:xfrm>
           <a:prstGeom prst="rect">
@@ -5639,8 +5644,8 @@
         </p:nvSpPr>
         <p:spPr>
           <a:xfrm>
-            <a:off x="4866278" y="2483347"/>
-            <a:ext cx="1299493" cy="169277"/>
+            <a:off x="5564109" y="2363031"/>
+            <a:ext cx="1299493" cy="161583"/>
           </a:xfrm>
           <a:prstGeom prst="rect">
             <a:avLst/>
@@ -5665,15 +5670,15 @@
           </a:lstStyle>
           <a:p>
             <a:r>
-              <a:rPr lang="en-US" sz="900" dirty="0" err="1"/>
+              <a:rPr lang="en-US" sz="800" dirty="0" err="1"/>
               <a:t>SetBudgetCommand</a:t>
             </a:r>
             <a:r>
-              <a:rPr lang="en-US" sz="900" dirty="0"/>
-              <a:t>(2.00</a:t>
-            </a:r>
-            <a:r>
-              <a:rPr lang="en-US" sz="1100" dirty="0"/>
+              <a:rPr lang="en-US" sz="800" dirty="0"/>
+              <a:t>(budget</a:t>
+            </a:r>
+            <a:r>
+              <a:rPr lang="en-US" sz="1050" dirty="0"/>
               <a:t>)</a:t>
             </a:r>
           </a:p>
@@ -5693,7 +5698,7 @@
         </p:nvCxnSpPr>
         <p:spPr>
           <a:xfrm>
-            <a:off x="4882618" y="4038600"/>
+            <a:off x="5580449" y="3918284"/>
             <a:ext cx="1492974" cy="0"/>
           </a:xfrm>
           <a:prstGeom prst="straightConnector1">
@@ -5737,7 +5742,7 @@
         </p:nvCxnSpPr>
         <p:spPr>
           <a:xfrm>
-            <a:off x="3124202" y="4084983"/>
+            <a:off x="3822033" y="3964667"/>
             <a:ext cx="1667219" cy="0"/>
           </a:xfrm>
           <a:prstGeom prst="straightConnector1">
@@ -5783,7 +5788,7 @@
         </p:nvCxnSpPr>
         <p:spPr>
           <a:xfrm>
-            <a:off x="6396187" y="3200400"/>
+            <a:off x="7094018" y="3080084"/>
             <a:ext cx="0" cy="1447800"/>
           </a:xfrm>
           <a:prstGeom prst="line">
@@ -5826,7 +5831,7 @@
         </p:nvSpPr>
         <p:spPr>
           <a:xfrm>
-            <a:off x="9104105" y="838200"/>
+            <a:off x="9801936" y="717884"/>
             <a:ext cx="1335297" cy="304800"/>
           </a:xfrm>
           <a:prstGeom prst="rect">
@@ -5908,7 +5913,7 @@
         </p:nvCxnSpPr>
         <p:spPr>
           <a:xfrm flipH="1">
-            <a:off x="9763539" y="1176858"/>
+            <a:off x="10461370" y="1056542"/>
             <a:ext cx="8210" cy="5024139"/>
           </a:xfrm>
           <a:prstGeom prst="line">
@@ -5956,7 +5961,7 @@
         </p:nvCxnSpPr>
         <p:spPr>
           <a:xfrm>
-            <a:off x="6478889" y="6200997"/>
+            <a:off x="7176720" y="6080681"/>
             <a:ext cx="3208450" cy="0"/>
           </a:xfrm>
           <a:prstGeom prst="straightConnector1">
@@ -6000,7 +6005,7 @@
         </p:nvCxnSpPr>
         <p:spPr>
           <a:xfrm flipV="1">
-            <a:off x="6477002" y="6400802"/>
+            <a:off x="7174833" y="6280486"/>
             <a:ext cx="3285523" cy="1"/>
           </a:xfrm>
           <a:prstGeom prst="straightConnector1">
@@ -6047,7 +6052,7 @@
         </p:nvSpPr>
         <p:spPr>
           <a:xfrm>
-            <a:off x="6661581" y="5987534"/>
+            <a:off x="7359412" y="5867218"/>
             <a:ext cx="2011237" cy="184666"/>
           </a:xfrm>
           <a:prstGeom prst="rect">
@@ -6080,7 +6085,7 @@
                   </a:schemeClr>
                 </a:solidFill>
               </a:rPr>
-              <a:t>Post(</a:t>
+              <a:t>post(</a:t>
             </a:r>
             <a:r>
               <a:rPr lang="en-US" sz="1200" dirty="0" err="1">
@@ -6119,7 +6124,7 @@
         </p:nvSpPr>
         <p:spPr>
           <a:xfrm>
-            <a:off x="9687339" y="6200997"/>
+            <a:off x="10385170" y="6080681"/>
             <a:ext cx="152400" cy="199803"/>
           </a:xfrm>
           <a:prstGeom prst="rect">

</xml_diff>

<commit_message>
Fix developer guide references to address book
</commit_message>
<xml_diff>
--- a/docs/diagrams/BudgetCommandSequenceDiagram.pptx
+++ b/docs/diagrams/BudgetCommandSequenceDiagram.pptx
@@ -261,7 +261,7 @@
           <a:p>
             <a:fld id="{846B6803-89CD-4F5F-B245-D2D1AEF34DFD}" type="datetimeFigureOut">
               <a:rPr lang="en-SG" smtClean="0"/>
-              <a:t>26/10/2018</a:t>
+              <a:t>11/11/2018</a:t>
             </a:fld>
             <a:endParaRPr lang="en-SG"/>
           </a:p>
@@ -461,7 +461,7 @@
           <a:p>
             <a:fld id="{846B6803-89CD-4F5F-B245-D2D1AEF34DFD}" type="datetimeFigureOut">
               <a:rPr lang="en-SG" smtClean="0"/>
-              <a:t>26/10/2018</a:t>
+              <a:t>11/11/2018</a:t>
             </a:fld>
             <a:endParaRPr lang="en-SG"/>
           </a:p>
@@ -671,7 +671,7 @@
           <a:p>
             <a:fld id="{846B6803-89CD-4F5F-B245-D2D1AEF34DFD}" type="datetimeFigureOut">
               <a:rPr lang="en-SG" smtClean="0"/>
-              <a:t>26/10/2018</a:t>
+              <a:t>11/11/2018</a:t>
             </a:fld>
             <a:endParaRPr lang="en-SG"/>
           </a:p>
@@ -871,7 +871,7 @@
           <a:p>
             <a:fld id="{846B6803-89CD-4F5F-B245-D2D1AEF34DFD}" type="datetimeFigureOut">
               <a:rPr lang="en-SG" smtClean="0"/>
-              <a:t>26/10/2018</a:t>
+              <a:t>11/11/2018</a:t>
             </a:fld>
             <a:endParaRPr lang="en-SG"/>
           </a:p>
@@ -1147,7 +1147,7 @@
           <a:p>
             <a:fld id="{846B6803-89CD-4F5F-B245-D2D1AEF34DFD}" type="datetimeFigureOut">
               <a:rPr lang="en-SG" smtClean="0"/>
-              <a:t>26/10/2018</a:t>
+              <a:t>11/11/2018</a:t>
             </a:fld>
             <a:endParaRPr lang="en-SG"/>
           </a:p>
@@ -1415,7 +1415,7 @@
           <a:p>
             <a:fld id="{846B6803-89CD-4F5F-B245-D2D1AEF34DFD}" type="datetimeFigureOut">
               <a:rPr lang="en-SG" smtClean="0"/>
-              <a:t>26/10/2018</a:t>
+              <a:t>11/11/2018</a:t>
             </a:fld>
             <a:endParaRPr lang="en-SG"/>
           </a:p>
@@ -1830,7 +1830,7 @@
           <a:p>
             <a:fld id="{846B6803-89CD-4F5F-B245-D2D1AEF34DFD}" type="datetimeFigureOut">
               <a:rPr lang="en-SG" smtClean="0"/>
-              <a:t>26/10/2018</a:t>
+              <a:t>11/11/2018</a:t>
             </a:fld>
             <a:endParaRPr lang="en-SG"/>
           </a:p>
@@ -1972,7 +1972,7 @@
           <a:p>
             <a:fld id="{846B6803-89CD-4F5F-B245-D2D1AEF34DFD}" type="datetimeFigureOut">
               <a:rPr lang="en-SG" smtClean="0"/>
-              <a:t>26/10/2018</a:t>
+              <a:t>11/11/2018</a:t>
             </a:fld>
             <a:endParaRPr lang="en-SG"/>
           </a:p>
@@ -2085,7 +2085,7 @@
           <a:p>
             <a:fld id="{846B6803-89CD-4F5F-B245-D2D1AEF34DFD}" type="datetimeFigureOut">
               <a:rPr lang="en-SG" smtClean="0"/>
-              <a:t>26/10/2018</a:t>
+              <a:t>11/11/2018</a:t>
             </a:fld>
             <a:endParaRPr lang="en-SG"/>
           </a:p>
@@ -2398,7 +2398,7 @@
           <a:p>
             <a:fld id="{846B6803-89CD-4F5F-B245-D2D1AEF34DFD}" type="datetimeFigureOut">
               <a:rPr lang="en-SG" smtClean="0"/>
-              <a:t>26/10/2018</a:t>
+              <a:t>11/11/2018</a:t>
             </a:fld>
             <a:endParaRPr lang="en-SG"/>
           </a:p>
@@ -2687,7 +2687,7 @@
           <a:p>
             <a:fld id="{846B6803-89CD-4F5F-B245-D2D1AEF34DFD}" type="datetimeFigureOut">
               <a:rPr lang="en-SG" smtClean="0"/>
-              <a:t>26/10/2018</a:t>
+              <a:t>11/11/2018</a:t>
             </a:fld>
             <a:endParaRPr lang="en-SG"/>
           </a:p>
@@ -2930,7 +2930,7 @@
           <a:p>
             <a:fld id="{846B6803-89CD-4F5F-B245-D2D1AEF34DFD}" type="datetimeFigureOut">
               <a:rPr lang="en-SG" smtClean="0"/>
-              <a:t>26/10/2018</a:t>
+              <a:t>11/11/2018</a:t>
             </a:fld>
             <a:endParaRPr lang="en-SG"/>
           </a:p>
@@ -3583,82 +3583,6 @@
           </a:p>
         </p:txBody>
       </p:sp>
-      <p:sp>
-        <p:nvSpPr>
-          <p:cNvPr id="8" name="Rectangle 62">
-            <a:extLst>
-              <a:ext uri="{FF2B5EF4-FFF2-40B4-BE49-F238E27FC236}">
-                <a16:creationId xmlns:a16="http://schemas.microsoft.com/office/drawing/2014/main" id="{1F947FA7-1BEC-4FBE-BE35-87F744CB7A2D}"/>
-              </a:ext>
-            </a:extLst>
-          </p:cNvPr>
-          <p:cNvSpPr/>
-          <p:nvPr/>
-        </p:nvSpPr>
-        <p:spPr>
-          <a:xfrm>
-            <a:off x="3060031" y="534993"/>
-            <a:ext cx="1219200" cy="467684"/>
-          </a:xfrm>
-          <a:prstGeom prst="rect">
-            <a:avLst/>
-          </a:prstGeom>
-          <a:solidFill>
-            <a:srgbClr val="0070C0"/>
-          </a:solidFill>
-          <a:ln w="19050">
-            <a:solidFill>
-              <a:srgbClr val="0070C0"/>
-            </a:solidFill>
-          </a:ln>
-          <a:effectLst/>
-        </p:spPr>
-        <p:style>
-          <a:lnRef idx="1">
-            <a:schemeClr val="accent2"/>
-          </a:lnRef>
-          <a:fillRef idx="2">
-            <a:schemeClr val="accent2"/>
-          </a:fillRef>
-          <a:effectRef idx="1">
-            <a:schemeClr val="accent2"/>
-          </a:effectRef>
-          <a:fontRef idx="minor">
-            <a:schemeClr val="dk1"/>
-          </a:fontRef>
-        </p:style>
-        <p:txBody>
-          <a:bodyPr rtlCol="0" anchor="ctr"/>
-          <a:lstStyle/>
-          <a:p>
-            <a:pPr algn="ctr"/>
-            <a:r>
-              <a:rPr lang="en-US" sz="1600" dirty="0">
-                <a:solidFill>
-                  <a:schemeClr val="bg1"/>
-                </a:solidFill>
-              </a:rPr>
-              <a:t>:Address</a:t>
-            </a:r>
-          </a:p>
-          <a:p>
-            <a:pPr algn="ctr"/>
-            <a:r>
-              <a:rPr lang="en-US" sz="1600" dirty="0" err="1">
-                <a:solidFill>
-                  <a:schemeClr val="bg1"/>
-                </a:solidFill>
-              </a:rPr>
-              <a:t>BookParser</a:t>
-            </a:r>
-            <a:endParaRPr lang="en-SG" sz="1600" dirty="0">
-              <a:solidFill>
-                <a:schemeClr val="bg1"/>
-              </a:solidFill>
-            </a:endParaRPr>
-          </a:p>
-        </p:txBody>
-      </p:sp>
       <p:cxnSp>
         <p:nvCxnSpPr>
           <p:cNvPr id="9" name="Straight Connector 8">
@@ -6170,6 +6094,82 @@
                 <a:schemeClr val="accent3">
                   <a:lumMod val="75000"/>
                 </a:schemeClr>
+              </a:solidFill>
+            </a:endParaRPr>
+          </a:p>
+        </p:txBody>
+      </p:sp>
+      <p:sp>
+        <p:nvSpPr>
+          <p:cNvPr id="58" name="Rectangle 62">
+            <a:extLst>
+              <a:ext uri="{FF2B5EF4-FFF2-40B4-BE49-F238E27FC236}">
+                <a16:creationId xmlns:a16="http://schemas.microsoft.com/office/drawing/2014/main" id="{51318388-2535-498F-84E1-249DE1BDFEEB}"/>
+              </a:ext>
+            </a:extLst>
+          </p:cNvPr>
+          <p:cNvSpPr/>
+          <p:nvPr/>
+        </p:nvSpPr>
+        <p:spPr>
+          <a:xfrm>
+            <a:off x="3000705" y="550208"/>
+            <a:ext cx="1391711" cy="487691"/>
+          </a:xfrm>
+          <a:prstGeom prst="rect">
+            <a:avLst/>
+          </a:prstGeom>
+          <a:solidFill>
+            <a:srgbClr val="0070C0"/>
+          </a:solidFill>
+          <a:ln w="19050">
+            <a:solidFill>
+              <a:srgbClr val="0070C0"/>
+            </a:solidFill>
+          </a:ln>
+          <a:effectLst/>
+        </p:spPr>
+        <p:style>
+          <a:lnRef idx="1">
+            <a:schemeClr val="accent2"/>
+          </a:lnRef>
+          <a:fillRef idx="2">
+            <a:schemeClr val="accent2"/>
+          </a:fillRef>
+          <a:effectRef idx="1">
+            <a:schemeClr val="accent2"/>
+          </a:effectRef>
+          <a:fontRef idx="minor">
+            <a:schemeClr val="dk1"/>
+          </a:fontRef>
+        </p:style>
+        <p:txBody>
+          <a:bodyPr rtlCol="0" anchor="ctr"/>
+          <a:lstStyle/>
+          <a:p>
+            <a:pPr algn="ctr"/>
+            <a:r>
+              <a:rPr lang="en-US" sz="1600" dirty="0">
+                <a:solidFill>
+                  <a:schemeClr val="bg1"/>
+                </a:solidFill>
+              </a:rPr>
+              <a:t>:Expense</a:t>
+            </a:r>
+          </a:p>
+          <a:p>
+            <a:pPr algn="ctr"/>
+            <a:r>
+              <a:rPr lang="en-US" sz="1600" dirty="0" err="1">
+                <a:solidFill>
+                  <a:schemeClr val="bg1"/>
+                </a:solidFill>
+              </a:rPr>
+              <a:t>TrackerParser</a:t>
+            </a:r>
+            <a:endParaRPr lang="en-SG" sz="1600" dirty="0">
+              <a:solidFill>
+                <a:schemeClr val="bg1"/>
               </a:solidFill>
             </a:endParaRPr>
           </a:p>

</xml_diff>